<commit_message>
chore: ensure models/example shows real data
*A Frame box was enlarged in model to fill bigger names and cpf;
*Random names and random cpfs were included in names example that looks real.
</commit_message>
<xml_diff>
--- a/model.example.pptx
+++ b/model.example.pptx
@@ -63,7 +63,7 @@
         <p:txBody>
           <a:bodyPr/>
           <a:p>
-            <a:fld id="{258FF869-F7D3-4A38-ABC8-C8BAF89F1D5C}" type="slidenum">
+            <a:fld id="{E61D158B-6B1B-49E7-A404-7C520AAFC247}" type="slidenum">
               <a:t>&lt;#&gt;</a:t>
             </a:fld>
           </a:p>
@@ -125,7 +125,7 @@
         <p:spPr>
           <a:xfrm>
             <a:off x="743040" y="1122480"/>
-            <a:ext cx="8419320" cy="2386800"/>
+            <a:ext cx="8418960" cy="2386440"/>
           </a:xfrm>
           <a:prstGeom prst="rect">
             <a:avLst/>
@@ -162,7 +162,7 @@
         <p:spPr>
           <a:xfrm>
             <a:off x="495000" y="1604520"/>
-            <a:ext cx="8915040" cy="1896840"/>
+            <a:ext cx="8914680" cy="1896840"/>
           </a:xfrm>
           <a:prstGeom prst="rect">
             <a:avLst/>
@@ -196,7 +196,7 @@
         <p:spPr>
           <a:xfrm>
             <a:off x="495000" y="3682080"/>
-            <a:ext cx="8915040" cy="1896840"/>
+            <a:ext cx="8914680" cy="1896840"/>
           </a:xfrm>
           <a:prstGeom prst="rect">
             <a:avLst/>
@@ -251,7 +251,7 @@
         <p:txBody>
           <a:bodyPr/>
           <a:p>
-            <a:fld id="{039008C6-52E3-402B-8536-AB038E329CD3}" type="slidenum">
+            <a:fld id="{2439280B-03B1-43E9-A29C-D0629EF9F8A8}" type="slidenum">
               <a:t>&lt;#&gt;</a:t>
             </a:fld>
           </a:p>
@@ -313,7 +313,7 @@
         <p:spPr>
           <a:xfrm>
             <a:off x="743040" y="1122480"/>
-            <a:ext cx="8419320" cy="2386800"/>
+            <a:ext cx="8418960" cy="2386440"/>
           </a:xfrm>
           <a:prstGeom prst="rect">
             <a:avLst/>
@@ -507,7 +507,7 @@
         <p:txBody>
           <a:bodyPr/>
           <a:p>
-            <a:fld id="{063E085E-CE87-4B98-AEE0-6C825851ED2D}" type="slidenum">
+            <a:fld id="{16A92C58-8666-4C15-B8F2-8DBEE25C3461}" type="slidenum">
               <a:t>&lt;#&gt;</a:t>
             </a:fld>
           </a:p>
@@ -569,7 +569,7 @@
         <p:spPr>
           <a:xfrm>
             <a:off x="743040" y="1122480"/>
-            <a:ext cx="8419320" cy="2386800"/>
+            <a:ext cx="8418960" cy="2386440"/>
           </a:xfrm>
           <a:prstGeom prst="rect">
             <a:avLst/>
@@ -831,7 +831,7 @@
         <p:txBody>
           <a:bodyPr/>
           <a:p>
-            <a:fld id="{A482AA2D-1D91-405B-972E-7F60027DD24B}" type="slidenum">
+            <a:fld id="{CF3C2503-4CCD-45AB-9E54-EE93062EF79E}" type="slidenum">
               <a:t>&lt;#&gt;</a:t>
             </a:fld>
           </a:p>
@@ -893,7 +893,7 @@
         <p:spPr>
           <a:xfrm>
             <a:off x="743040" y="1122480"/>
-            <a:ext cx="8419320" cy="2386800"/>
+            <a:ext cx="8418960" cy="2386440"/>
           </a:xfrm>
           <a:prstGeom prst="rect">
             <a:avLst/>
@@ -930,7 +930,7 @@
         <p:spPr>
           <a:xfrm>
             <a:off x="495000" y="1604520"/>
-            <a:ext cx="8915040" cy="3977280"/>
+            <a:ext cx="8914680" cy="3976920"/>
           </a:xfrm>
           <a:prstGeom prst="rect">
             <a:avLst/>
@@ -988,7 +988,7 @@
         <p:txBody>
           <a:bodyPr/>
           <a:p>
-            <a:fld id="{D08FE469-455E-41FB-A329-A3EECBFFE6C8}" type="slidenum">
+            <a:fld id="{9522D008-C627-45E7-AAA3-77BA7777F0D6}" type="slidenum">
               <a:t>&lt;#&gt;</a:t>
             </a:fld>
           </a:p>
@@ -1050,7 +1050,7 @@
         <p:spPr>
           <a:xfrm>
             <a:off x="743040" y="1122480"/>
-            <a:ext cx="8419320" cy="2386800"/>
+            <a:ext cx="8418960" cy="2386440"/>
           </a:xfrm>
           <a:prstGeom prst="rect">
             <a:avLst/>
@@ -1087,7 +1087,7 @@
         <p:spPr>
           <a:xfrm>
             <a:off x="495000" y="1604520"/>
-            <a:ext cx="8915040" cy="3977280"/>
+            <a:ext cx="8914680" cy="3976920"/>
           </a:xfrm>
           <a:prstGeom prst="rect">
             <a:avLst/>
@@ -1142,7 +1142,7 @@
         <p:txBody>
           <a:bodyPr/>
           <a:p>
-            <a:fld id="{D27AD274-22D9-4E7E-81C7-3FE70B6C489A}" type="slidenum">
+            <a:fld id="{AC7A5BCF-80A9-4E34-AB2C-1D672163F63C}" type="slidenum">
               <a:t>&lt;#&gt;</a:t>
             </a:fld>
           </a:p>
@@ -1204,7 +1204,7 @@
         <p:spPr>
           <a:xfrm>
             <a:off x="743040" y="1122480"/>
-            <a:ext cx="8419320" cy="2386800"/>
+            <a:ext cx="8418960" cy="2386440"/>
           </a:xfrm>
           <a:prstGeom prst="rect">
             <a:avLst/>
@@ -1241,7 +1241,7 @@
         <p:spPr>
           <a:xfrm>
             <a:off x="495000" y="1604520"/>
-            <a:ext cx="4350240" cy="3977280"/>
+            <a:ext cx="4350240" cy="3976920"/>
           </a:xfrm>
           <a:prstGeom prst="rect">
             <a:avLst/>
@@ -1275,7 +1275,7 @@
         <p:spPr>
           <a:xfrm>
             <a:off x="5063040" y="1604520"/>
-            <a:ext cx="4350240" cy="3977280"/>
+            <a:ext cx="4350240" cy="3976920"/>
           </a:xfrm>
           <a:prstGeom prst="rect">
             <a:avLst/>
@@ -1330,7 +1330,7 @@
         <p:txBody>
           <a:bodyPr/>
           <a:p>
-            <a:fld id="{995855F5-590B-477B-84DB-004E4F3ED7F9}" type="slidenum">
+            <a:fld id="{4E8DCB4E-094E-4B47-9DCE-443D8F33BDDC}" type="slidenum">
               <a:t>&lt;#&gt;</a:t>
             </a:fld>
           </a:p>
@@ -1392,7 +1392,7 @@
         <p:spPr>
           <a:xfrm>
             <a:off x="743040" y="1122480"/>
-            <a:ext cx="8419320" cy="2386800"/>
+            <a:ext cx="8418960" cy="2386440"/>
           </a:xfrm>
           <a:prstGeom prst="rect">
             <a:avLst/>
@@ -1450,7 +1450,7 @@
         <p:txBody>
           <a:bodyPr/>
           <a:p>
-            <a:fld id="{C263909C-6715-476A-9A2E-91DDCF476B2F}" type="slidenum">
+            <a:fld id="{4D773085-036C-4B37-8D79-E8EF1FDD2798}" type="slidenum">
               <a:t>&lt;#&gt;</a:t>
             </a:fld>
           </a:p>
@@ -1512,7 +1512,7 @@
         <p:spPr>
           <a:xfrm>
             <a:off x="743040" y="1122480"/>
-            <a:ext cx="8419320" cy="11064960"/>
+            <a:ext cx="8418960" cy="11063520"/>
           </a:xfrm>
           <a:prstGeom prst="rect">
             <a:avLst/>
@@ -1570,7 +1570,7 @@
         <p:txBody>
           <a:bodyPr/>
           <a:p>
-            <a:fld id="{FEC3BFDE-9F4B-4E24-961E-5B4A5341F1A3}" type="slidenum">
+            <a:fld id="{617B114D-35CD-445D-A453-6354B8722CE6}" type="slidenum">
               <a:t>&lt;#&gt;</a:t>
             </a:fld>
           </a:p>
@@ -1632,7 +1632,7 @@
         <p:spPr>
           <a:xfrm>
             <a:off x="743040" y="1122480"/>
-            <a:ext cx="8419320" cy="2386800"/>
+            <a:ext cx="8418960" cy="2386440"/>
           </a:xfrm>
           <a:prstGeom prst="rect">
             <a:avLst/>
@@ -1703,7 +1703,7 @@
         <p:spPr>
           <a:xfrm>
             <a:off x="5063040" y="1604520"/>
-            <a:ext cx="4350240" cy="3977280"/>
+            <a:ext cx="4350240" cy="3976920"/>
           </a:xfrm>
           <a:prstGeom prst="rect">
             <a:avLst/>
@@ -1792,7 +1792,7 @@
         <p:txBody>
           <a:bodyPr/>
           <a:p>
-            <a:fld id="{9C0034A3-F58D-4426-91A8-75B7717F9826}" type="slidenum">
+            <a:fld id="{F3946CE9-0648-4548-B650-845AD21602BA}" type="slidenum">
               <a:t>&lt;#&gt;</a:t>
             </a:fld>
           </a:p>
@@ -1854,7 +1854,7 @@
         <p:spPr>
           <a:xfrm>
             <a:off x="743040" y="1122480"/>
-            <a:ext cx="8419320" cy="2386800"/>
+            <a:ext cx="8418960" cy="2386440"/>
           </a:xfrm>
           <a:prstGeom prst="rect">
             <a:avLst/>
@@ -1891,7 +1891,7 @@
         <p:spPr>
           <a:xfrm>
             <a:off x="495000" y="1604520"/>
-            <a:ext cx="4350240" cy="3977280"/>
+            <a:ext cx="4350240" cy="3976920"/>
           </a:xfrm>
           <a:prstGeom prst="rect">
             <a:avLst/>
@@ -2014,7 +2014,7 @@
         <p:txBody>
           <a:bodyPr/>
           <a:p>
-            <a:fld id="{E1265E83-68CF-4975-8D15-B93679CDBAC2}" type="slidenum">
+            <a:fld id="{7C49E0AF-642C-440D-8C53-5C4F29E74A14}" type="slidenum">
               <a:t>&lt;#&gt;</a:t>
             </a:fld>
           </a:p>
@@ -2076,7 +2076,7 @@
         <p:spPr>
           <a:xfrm>
             <a:off x="743040" y="1122480"/>
-            <a:ext cx="8419320" cy="2386800"/>
+            <a:ext cx="8418960" cy="2386440"/>
           </a:xfrm>
           <a:prstGeom prst="rect">
             <a:avLst/>
@@ -2181,7 +2181,7 @@
         <p:spPr>
           <a:xfrm>
             <a:off x="495000" y="3682080"/>
-            <a:ext cx="8915040" cy="1896840"/>
+            <a:ext cx="8914680" cy="1896840"/>
           </a:xfrm>
           <a:prstGeom prst="rect">
             <a:avLst/>
@@ -2236,7 +2236,7 @@
         <p:txBody>
           <a:bodyPr/>
           <a:p>
-            <a:fld id="{890E7339-2E63-48B7-8423-F9A87096493C}" type="slidenum">
+            <a:fld id="{94C97617-29D8-4B42-A9F1-4C7EC80B2171}" type="slidenum">
               <a:t>&lt;#&gt;</a:t>
             </a:fld>
           </a:p>
@@ -2305,7 +2305,7 @@
         <p:spPr>
           <a:xfrm>
             <a:off x="743040" y="1122480"/>
-            <a:ext cx="8419320" cy="2386800"/>
+            <a:ext cx="8418960" cy="2386440"/>
           </a:xfrm>
           <a:prstGeom prst="rect">
             <a:avLst/>
@@ -2324,29 +2324,200 @@
               <a:rPr b="0" lang="pt-BR" sz="1800" spc="-1" strike="noStrike">
                 <a:latin typeface="Arial"/>
               </a:rPr>
-              <a:t>Click to edit </a:t>
-            </a:r>
+              <a:t>Click to edit the title text format</a:t>
+            </a:r>
+            <a:endParaRPr b="0" lang="pt-BR" sz="1800" spc="-1" strike="noStrike">
+              <a:latin typeface="Arial"/>
+            </a:endParaRPr>
+          </a:p>
+        </p:txBody>
+      </p:sp>
+      <p:sp>
+        <p:nvSpPr>
+          <p:cNvPr id="1" name="PlaceHolder 2"/>
+          <p:cNvSpPr>
+            <a:spLocks noGrp="1"/>
+          </p:cNvSpPr>
+          <p:nvPr>
+            <p:ph type="body"/>
+          </p:nvPr>
+        </p:nvSpPr>
+        <p:spPr>
+          <a:xfrm>
+            <a:off x="495000" y="1604520"/>
+            <a:ext cx="8914680" cy="3976920"/>
+          </a:xfrm>
+          <a:prstGeom prst="rect">
+            <a:avLst/>
+          </a:prstGeom>
+          <a:noFill/>
+          <a:ln w="0">
+            <a:noFill/>
+          </a:ln>
+        </p:spPr>
+        <p:txBody>
+          <a:bodyPr lIns="0" rIns="0" tIns="0" bIns="0" anchor="t">
+            <a:normAutofit/>
+          </a:bodyPr>
+          <a:p>
+            <a:pPr marL="432000" indent="-324000">
+              <a:spcBef>
+                <a:spcPts val="1417"/>
+              </a:spcBef>
+              <a:buClr>
+                <a:srgbClr val="000000"/>
+              </a:buClr>
+              <a:buSzPct val="45000"/>
+              <a:buFont typeface="Wingdings" charset="2"/>
+              <a:buChar char=""/>
+            </a:pPr>
             <a:r>
               <a:rPr b="0" lang="pt-BR" sz="1800" spc="-1" strike="noStrike">
                 <a:latin typeface="Arial"/>
               </a:rPr>
-              <a:t>the title text </a:t>
-            </a:r>
+              <a:t>Click to edit the outline text format</a:t>
+            </a:r>
+            <a:endParaRPr b="0" lang="pt-BR" sz="1800" spc="-1" strike="noStrike">
+              <a:latin typeface="Arial"/>
+            </a:endParaRPr>
+          </a:p>
+          <a:p>
+            <a:pPr lvl="1" marL="864000" indent="-324000">
+              <a:spcBef>
+                <a:spcPts val="1134"/>
+              </a:spcBef>
+              <a:buClr>
+                <a:srgbClr val="000000"/>
+              </a:buClr>
+              <a:buSzPct val="75000"/>
+              <a:buFont typeface="Symbol" charset="2"/>
+              <a:buChar char=""/>
+            </a:pPr>
             <a:r>
               <a:rPr b="0" lang="pt-BR" sz="1800" spc="-1" strike="noStrike">
                 <a:latin typeface="Arial"/>
               </a:rPr>
-              <a:t>format</a:t>
+              <a:t>Second Outline Level</a:t>
             </a:r>
             <a:endParaRPr b="0" lang="pt-BR" sz="1800" spc="-1" strike="noStrike">
               <a:latin typeface="Arial"/>
             </a:endParaRPr>
           </a:p>
-        </p:txBody>
-      </p:sp>
-      <p:sp>
-        <p:nvSpPr>
-          <p:cNvPr id="1" name="PlaceHolder 2"/>
+          <a:p>
+            <a:pPr lvl="2" marL="1296000" indent="-288000">
+              <a:spcBef>
+                <a:spcPts val="850"/>
+              </a:spcBef>
+              <a:buClr>
+                <a:srgbClr val="000000"/>
+              </a:buClr>
+              <a:buSzPct val="45000"/>
+              <a:buFont typeface="Wingdings" charset="2"/>
+              <a:buChar char=""/>
+            </a:pPr>
+            <a:r>
+              <a:rPr b="0" lang="pt-BR" sz="1800" spc="-1" strike="noStrike">
+                <a:latin typeface="Arial"/>
+              </a:rPr>
+              <a:t>Third Outline Level</a:t>
+            </a:r>
+            <a:endParaRPr b="0" lang="pt-BR" sz="1800" spc="-1" strike="noStrike">
+              <a:latin typeface="Arial"/>
+            </a:endParaRPr>
+          </a:p>
+          <a:p>
+            <a:pPr lvl="3" marL="1728000" indent="-216000">
+              <a:spcBef>
+                <a:spcPts val="567"/>
+              </a:spcBef>
+              <a:buClr>
+                <a:srgbClr val="000000"/>
+              </a:buClr>
+              <a:buSzPct val="75000"/>
+              <a:buFont typeface="Symbol" charset="2"/>
+              <a:buChar char=""/>
+            </a:pPr>
+            <a:r>
+              <a:rPr b="0" lang="pt-BR" sz="1800" spc="-1" strike="noStrike">
+                <a:latin typeface="Arial"/>
+              </a:rPr>
+              <a:t>Fourth Outline Level</a:t>
+            </a:r>
+            <a:endParaRPr b="0" lang="pt-BR" sz="1800" spc="-1" strike="noStrike">
+              <a:latin typeface="Arial"/>
+            </a:endParaRPr>
+          </a:p>
+          <a:p>
+            <a:pPr lvl="4" marL="2160000" indent="-216000">
+              <a:spcBef>
+                <a:spcPts val="283"/>
+              </a:spcBef>
+              <a:buClr>
+                <a:srgbClr val="000000"/>
+              </a:buClr>
+              <a:buSzPct val="45000"/>
+              <a:buFont typeface="Wingdings" charset="2"/>
+              <a:buChar char=""/>
+            </a:pPr>
+            <a:r>
+              <a:rPr b="0" lang="pt-BR" sz="1800" spc="-1" strike="noStrike">
+                <a:latin typeface="Arial"/>
+              </a:rPr>
+              <a:t>Fifth Outline Level</a:t>
+            </a:r>
+            <a:endParaRPr b="0" lang="pt-BR" sz="1800" spc="-1" strike="noStrike">
+              <a:latin typeface="Arial"/>
+            </a:endParaRPr>
+          </a:p>
+          <a:p>
+            <a:pPr lvl="5" marL="2592000" indent="-216000">
+              <a:spcBef>
+                <a:spcPts val="283"/>
+              </a:spcBef>
+              <a:buClr>
+                <a:srgbClr val="000000"/>
+              </a:buClr>
+              <a:buSzPct val="45000"/>
+              <a:buFont typeface="Wingdings" charset="2"/>
+              <a:buChar char=""/>
+            </a:pPr>
+            <a:r>
+              <a:rPr b="0" lang="pt-BR" sz="1800" spc="-1" strike="noStrike">
+                <a:latin typeface="Arial"/>
+              </a:rPr>
+              <a:t>Sixth Outline Level</a:t>
+            </a:r>
+            <a:endParaRPr b="0" lang="pt-BR" sz="1800" spc="-1" strike="noStrike">
+              <a:latin typeface="Arial"/>
+            </a:endParaRPr>
+          </a:p>
+          <a:p>
+            <a:pPr lvl="6" marL="3024000" indent="-216000">
+              <a:spcBef>
+                <a:spcPts val="283"/>
+              </a:spcBef>
+              <a:buClr>
+                <a:srgbClr val="000000"/>
+              </a:buClr>
+              <a:buSzPct val="45000"/>
+              <a:buFont typeface="Wingdings" charset="2"/>
+              <a:buChar char=""/>
+            </a:pPr>
+            <a:r>
+              <a:rPr b="0" lang="pt-BR" sz="1800" spc="-1" strike="noStrike">
+                <a:latin typeface="Arial"/>
+              </a:rPr>
+              <a:t>Seventh Outline Level</a:t>
+            </a:r>
+            <a:endParaRPr b="0" lang="pt-BR" sz="1800" spc="-1" strike="noStrike">
+              <a:latin typeface="Arial"/>
+            </a:endParaRPr>
+          </a:p>
+        </p:txBody>
+      </p:sp>
+      <p:sp>
+        <p:nvSpPr>
+          <p:cNvPr id="2" name="PlaceHolder 3"/>
           <p:cNvSpPr>
             <a:spLocks noGrp="1"/>
           </p:cNvSpPr>
@@ -2357,7 +2528,7 @@
         <p:spPr>
           <a:xfrm>
             <a:off x="3281400" y="6356520"/>
-            <a:ext cx="3342600" cy="364320"/>
+            <a:ext cx="3342240" cy="363960"/>
           </a:xfrm>
           <a:prstGeom prst="rect">
             <a:avLst/>
@@ -2403,7 +2574,7 @@
       </p:sp>
       <p:sp>
         <p:nvSpPr>
-          <p:cNvPr id="2" name="PlaceHolder 3"/>
+          <p:cNvPr id="3" name="PlaceHolder 4"/>
           <p:cNvSpPr>
             <a:spLocks noGrp="1"/>
           </p:cNvSpPr>
@@ -2414,7 +2585,7 @@
         <p:spPr>
           <a:xfrm>
             <a:off x="6996240" y="6356520"/>
-            <a:ext cx="2228040" cy="364320"/>
+            <a:ext cx="2227680" cy="363960"/>
           </a:xfrm>
           <a:prstGeom prst="rect">
             <a:avLst/>
@@ -2449,7 +2620,7 @@
               </a:lnSpc>
               <a:buNone/>
             </a:pPr>
-            <a:fld id="{2F69B0D9-D94B-4EB1-AC5E-CB0B4E98B133}" type="slidenum">
+            <a:fld id="{57232657-EFE5-4B4C-ABB3-DFFCAB629674}" type="slidenum">
               <a:rPr b="0" lang="pt-BR" sz="1200" spc="-1" strike="noStrike">
                 <a:solidFill>
                   <a:srgbClr val="8b8b8b"/>
@@ -2466,7 +2637,7 @@
       </p:sp>
       <p:sp>
         <p:nvSpPr>
-          <p:cNvPr id="3" name="PlaceHolder 4"/>
+          <p:cNvPr id="4" name="PlaceHolder 5"/>
           <p:cNvSpPr>
             <a:spLocks noGrp="1"/>
           </p:cNvSpPr>
@@ -2477,7 +2648,7 @@
         <p:spPr>
           <a:xfrm>
             <a:off x="681120" y="6356520"/>
-            <a:ext cx="2228040" cy="364320"/>
+            <a:ext cx="2227680" cy="363960"/>
           </a:xfrm>
           <a:prstGeom prst="rect">
             <a:avLst/>
@@ -2507,189 +2678,6 @@
             </a:r>
             <a:endParaRPr b="0" lang="pt-BR" sz="1400" spc="-1" strike="noStrike">
               <a:latin typeface="Times New Roman"/>
-            </a:endParaRPr>
-          </a:p>
-        </p:txBody>
-      </p:sp>
-      <p:sp>
-        <p:nvSpPr>
-          <p:cNvPr id="4" name="PlaceHolder 5"/>
-          <p:cNvSpPr>
-            <a:spLocks noGrp="1"/>
-          </p:cNvSpPr>
-          <p:nvPr>
-            <p:ph type="body"/>
-          </p:nvPr>
-        </p:nvSpPr>
-        <p:spPr>
-          <a:xfrm>
-            <a:off x="495000" y="1604520"/>
-            <a:ext cx="8915040" cy="3977280"/>
-          </a:xfrm>
-          <a:prstGeom prst="rect">
-            <a:avLst/>
-          </a:prstGeom>
-          <a:noFill/>
-          <a:ln w="0">
-            <a:noFill/>
-          </a:ln>
-        </p:spPr>
-        <p:txBody>
-          <a:bodyPr lIns="0" rIns="0" tIns="0" bIns="0" anchor="t">
-            <a:normAutofit/>
-          </a:bodyPr>
-          <a:p>
-            <a:pPr marL="432000" indent="-324000">
-              <a:spcBef>
-                <a:spcPts val="1417"/>
-              </a:spcBef>
-              <a:buClr>
-                <a:srgbClr val="000000"/>
-              </a:buClr>
-              <a:buSzPct val="45000"/>
-              <a:buFont typeface="Wingdings" charset="2"/>
-              <a:buChar char=""/>
-            </a:pPr>
-            <a:r>
-              <a:rPr b="0" lang="pt-BR" sz="3200" spc="-1" strike="noStrike">
-                <a:latin typeface="Arial"/>
-              </a:rPr>
-              <a:t>Click to edit the outline text format</a:t>
-            </a:r>
-            <a:endParaRPr b="0" lang="pt-BR" sz="3200" spc="-1" strike="noStrike">
-              <a:latin typeface="Arial"/>
-            </a:endParaRPr>
-          </a:p>
-          <a:p>
-            <a:pPr lvl="1" marL="864000" indent="-324000">
-              <a:spcBef>
-                <a:spcPts val="1134"/>
-              </a:spcBef>
-              <a:buClr>
-                <a:srgbClr val="000000"/>
-              </a:buClr>
-              <a:buSzPct val="75000"/>
-              <a:buFont typeface="Symbol" charset="2"/>
-              <a:buChar char=""/>
-            </a:pPr>
-            <a:r>
-              <a:rPr b="0" lang="pt-BR" sz="2800" spc="-1" strike="noStrike">
-                <a:latin typeface="Arial"/>
-              </a:rPr>
-              <a:t>Second Outline Level</a:t>
-            </a:r>
-            <a:endParaRPr b="0" lang="pt-BR" sz="2800" spc="-1" strike="noStrike">
-              <a:latin typeface="Arial"/>
-            </a:endParaRPr>
-          </a:p>
-          <a:p>
-            <a:pPr lvl="2" marL="1296000" indent="-288000">
-              <a:spcBef>
-                <a:spcPts val="850"/>
-              </a:spcBef>
-              <a:buClr>
-                <a:srgbClr val="000000"/>
-              </a:buClr>
-              <a:buSzPct val="45000"/>
-              <a:buFont typeface="Wingdings" charset="2"/>
-              <a:buChar char=""/>
-            </a:pPr>
-            <a:r>
-              <a:rPr b="0" lang="pt-BR" sz="2400" spc="-1" strike="noStrike">
-                <a:latin typeface="Arial"/>
-              </a:rPr>
-              <a:t>Third Outline Level</a:t>
-            </a:r>
-            <a:endParaRPr b="0" lang="pt-BR" sz="2400" spc="-1" strike="noStrike">
-              <a:latin typeface="Arial"/>
-            </a:endParaRPr>
-          </a:p>
-          <a:p>
-            <a:pPr lvl="3" marL="1728000" indent="-216000">
-              <a:spcBef>
-                <a:spcPts val="567"/>
-              </a:spcBef>
-              <a:buClr>
-                <a:srgbClr val="000000"/>
-              </a:buClr>
-              <a:buSzPct val="75000"/>
-              <a:buFont typeface="Symbol" charset="2"/>
-              <a:buChar char=""/>
-            </a:pPr>
-            <a:r>
-              <a:rPr b="0" lang="pt-BR" sz="2000" spc="-1" strike="noStrike">
-                <a:latin typeface="Arial"/>
-              </a:rPr>
-              <a:t>Fourth Outline Level</a:t>
-            </a:r>
-            <a:endParaRPr b="0" lang="pt-BR" sz="2000" spc="-1" strike="noStrike">
-              <a:latin typeface="Arial"/>
-            </a:endParaRPr>
-          </a:p>
-          <a:p>
-            <a:pPr lvl="4" marL="2160000" indent="-216000">
-              <a:spcBef>
-                <a:spcPts val="283"/>
-              </a:spcBef>
-              <a:buClr>
-                <a:srgbClr val="000000"/>
-              </a:buClr>
-              <a:buSzPct val="45000"/>
-              <a:buFont typeface="Wingdings" charset="2"/>
-              <a:buChar char=""/>
-            </a:pPr>
-            <a:r>
-              <a:rPr b="0" lang="pt-BR" sz="2000" spc="-1" strike="noStrike">
-                <a:latin typeface="Arial"/>
-              </a:rPr>
-              <a:t>Fifth Outline Level</a:t>
-            </a:r>
-            <a:endParaRPr b="0" lang="pt-BR" sz="2000" spc="-1" strike="noStrike">
-              <a:latin typeface="Arial"/>
-            </a:endParaRPr>
-          </a:p>
-          <a:p>
-            <a:pPr lvl="5" marL="2592000" indent="-216000">
-              <a:spcBef>
-                <a:spcPts val="283"/>
-              </a:spcBef>
-              <a:buClr>
-                <a:srgbClr val="000000"/>
-              </a:buClr>
-              <a:buSzPct val="45000"/>
-              <a:buFont typeface="Wingdings" charset="2"/>
-              <a:buChar char=""/>
-            </a:pPr>
-            <a:r>
-              <a:rPr b="0" lang="pt-BR" sz="2000" spc="-1" strike="noStrike">
-                <a:latin typeface="Arial"/>
-              </a:rPr>
-              <a:t>Sixth Outline Level</a:t>
-            </a:r>
-            <a:endParaRPr b="0" lang="pt-BR" sz="2000" spc="-1" strike="noStrike">
-              <a:latin typeface="Arial"/>
-            </a:endParaRPr>
-          </a:p>
-          <a:p>
-            <a:pPr lvl="6" marL="3024000" indent="-216000">
-              <a:spcBef>
-                <a:spcPts val="283"/>
-              </a:spcBef>
-              <a:buClr>
-                <a:srgbClr val="000000"/>
-              </a:buClr>
-              <a:buSzPct val="45000"/>
-              <a:buFont typeface="Wingdings" charset="2"/>
-              <a:buChar char=""/>
-            </a:pPr>
-            <a:r>
-              <a:rPr b="0" lang="pt-BR" sz="2000" spc="-1" strike="noStrike">
-                <a:latin typeface="Arial"/>
-              </a:rPr>
-              <a:t>Seventh Outline Level</a:t>
-            </a:r>
-            <a:endParaRPr b="0" lang="pt-BR" sz="2000" spc="-1" strike="noStrike">
-              <a:latin typeface="Arial"/>
             </a:endParaRPr>
           </a:p>
         </p:txBody>
@@ -2739,8 +2727,8 @@
         </p:nvSpPr>
         <p:spPr>
           <a:xfrm>
-            <a:off x="4207320" y="3182760"/>
-            <a:ext cx="1490400" cy="881640"/>
+            <a:off x="0" y="3240000"/>
+            <a:ext cx="9906120" cy="881640"/>
           </a:xfrm>
           <a:prstGeom prst="rect">
             <a:avLst/>
@@ -2761,7 +2749,7 @@
             <a:spAutoFit/>
           </a:bodyPr>
           <a:p>
-            <a:pPr>
+            <a:pPr algn="ctr">
               <a:lnSpc>
                 <a:spcPct val="100000"/>
               </a:lnSpc>

</xml_diff>